<commit_message>
Train-003 modifed 1st version for Productivity_Git_Training.pptx
</commit_message>
<xml_diff>
--- a/Productivity_Git_Training.pptx
+++ b/Productivity_Git_Training.pptx
@@ -9,7 +9,16 @@
     <p:sldId id="257" r:id="rId3"/>
     <p:sldId id="258" r:id="rId4"/>
     <p:sldId id="259" r:id="rId5"/>
-    <p:sldId id="260" r:id="rId6"/>
+    <p:sldId id="263" r:id="rId6"/>
+    <p:sldId id="264" r:id="rId7"/>
+    <p:sldId id="266" r:id="rId8"/>
+    <p:sldId id="261" r:id="rId9"/>
+    <p:sldId id="262" r:id="rId10"/>
+    <p:sldId id="265" r:id="rId11"/>
+    <p:sldId id="268" r:id="rId12"/>
+    <p:sldId id="267" r:id="rId13"/>
+    <p:sldId id="260" r:id="rId14"/>
+    <p:sldId id="269" r:id="rId15"/>
   </p:sldIdLst>
   <p:sldSz cx="9144000" cy="6858000" type="screen4x3"/>
   <p:notesSz cx="6858000" cy="9144000"/>
@@ -254,7 +263,7 @@
           <a:p>
             <a:fld id="{CE7799F8-1BDC-4800-8247-B1CB72F06477}" type="datetimeFigureOut">
               <a:rPr lang="en-US" smtClean="0"/>
-              <a:t>12/3/2015</a:t>
+              <a:t>12/4/2015</a:t>
             </a:fld>
             <a:endParaRPr lang="en-US"/>
           </a:p>
@@ -613,7 +622,7 @@
           <a:p>
             <a:fld id="{CE7799F8-1BDC-4800-8247-B1CB72F06477}" type="datetimeFigureOut">
               <a:rPr lang="en-US" smtClean="0"/>
-              <a:t>12/3/2015</a:t>
+              <a:t>12/4/2015</a:t>
             </a:fld>
             <a:endParaRPr lang="en-US"/>
           </a:p>
@@ -788,7 +797,7 @@
           <a:p>
             <a:fld id="{CE7799F8-1BDC-4800-8247-B1CB72F06477}" type="datetimeFigureOut">
               <a:rPr lang="en-US" smtClean="0"/>
-              <a:t>12/3/2015</a:t>
+              <a:t>12/4/2015</a:t>
             </a:fld>
             <a:endParaRPr lang="en-US"/>
           </a:p>
@@ -1023,7 +1032,7 @@
           <a:p>
             <a:fld id="{CE7799F8-1BDC-4800-8247-B1CB72F06477}" type="datetimeFigureOut">
               <a:rPr lang="en-US" smtClean="0"/>
-              <a:t>12/3/2015</a:t>
+              <a:t>12/4/2015</a:t>
             </a:fld>
             <a:endParaRPr lang="en-US"/>
           </a:p>
@@ -1292,7 +1301,7 @@
           <a:p>
             <a:fld id="{CE7799F8-1BDC-4800-8247-B1CB72F06477}" type="datetimeFigureOut">
               <a:rPr lang="en-US" smtClean="0"/>
-              <a:t>12/3/2015</a:t>
+              <a:t>12/4/2015</a:t>
             </a:fld>
             <a:endParaRPr lang="en-US"/>
           </a:p>
@@ -1512,7 +1521,7 @@
           <a:p>
             <a:fld id="{CE7799F8-1BDC-4800-8247-B1CB72F06477}" type="datetimeFigureOut">
               <a:rPr lang="en-US" smtClean="0"/>
-              <a:t>12/3/2015</a:t>
+              <a:t>12/4/2015</a:t>
             </a:fld>
             <a:endParaRPr lang="en-US"/>
           </a:p>
@@ -1864,7 +1873,7 @@
           <a:p>
             <a:fld id="{CE7799F8-1BDC-4800-8247-B1CB72F06477}" type="datetimeFigureOut">
               <a:rPr lang="en-US" smtClean="0"/>
-              <a:t>12/3/2015</a:t>
+              <a:t>12/4/2015</a:t>
             </a:fld>
             <a:endParaRPr lang="en-US"/>
           </a:p>
@@ -2096,7 +2105,7 @@
           <a:p>
             <a:fld id="{CE7799F8-1BDC-4800-8247-B1CB72F06477}" type="datetimeFigureOut">
               <a:rPr lang="en-US" smtClean="0"/>
-              <a:t>12/3/2015</a:t>
+              <a:t>12/4/2015</a:t>
             </a:fld>
             <a:endParaRPr lang="en-US"/>
           </a:p>
@@ -2236,7 +2245,7 @@
           <a:p>
             <a:fld id="{CE7799F8-1BDC-4800-8247-B1CB72F06477}" type="datetimeFigureOut">
               <a:rPr lang="en-US" smtClean="0"/>
-              <a:t>12/3/2015</a:t>
+              <a:t>12/4/2015</a:t>
             </a:fld>
             <a:endParaRPr lang="en-US"/>
           </a:p>
@@ -2513,7 +2522,7 @@
           <a:p>
             <a:fld id="{CE7799F8-1BDC-4800-8247-B1CB72F06477}" type="datetimeFigureOut">
               <a:rPr lang="en-US" smtClean="0"/>
-              <a:t>12/3/2015</a:t>
+              <a:t>12/4/2015</a:t>
             </a:fld>
             <a:endParaRPr lang="en-US"/>
           </a:p>
@@ -2920,7 +2929,7 @@
           <a:p>
             <a:fld id="{CE7799F8-1BDC-4800-8247-B1CB72F06477}" type="datetimeFigureOut">
               <a:rPr lang="en-US" smtClean="0"/>
-              <a:t>12/3/2015</a:t>
+              <a:t>12/4/2015</a:t>
             </a:fld>
             <a:endParaRPr lang="en-US"/>
           </a:p>
@@ -3258,7 +3267,7 @@
           <a:p>
             <a:fld id="{CE7799F8-1BDC-4800-8247-B1CB72F06477}" type="datetimeFigureOut">
               <a:rPr lang="en-US" smtClean="0"/>
-              <a:t>12/3/2015</a:t>
+              <a:t>12/4/2015</a:t>
             </a:fld>
             <a:endParaRPr lang="en-US"/>
           </a:p>
@@ -3893,6 +3902,1106 @@
 </p:sld>
 </file>
 
+<file path=ppt/slides/slide10.xml><?xml version="1.0" encoding="utf-8"?>
+<p:sld xmlns:a="http://schemas.openxmlformats.org/drawingml/2006/main" xmlns:r="http://schemas.openxmlformats.org/officeDocument/2006/relationships" xmlns:p="http://schemas.openxmlformats.org/presentationml/2006/main">
+  <p:cSld>
+    <p:spTree>
+      <p:nvGrpSpPr>
+        <p:cNvPr id="1" name=""/>
+        <p:cNvGrpSpPr/>
+        <p:nvPr/>
+      </p:nvGrpSpPr>
+      <p:grpSpPr>
+        <a:xfrm>
+          <a:off x="0" y="0"/>
+          <a:ext cx="0" cy="0"/>
+          <a:chOff x="0" y="0"/>
+          <a:chExt cx="0" cy="0"/>
+        </a:xfrm>
+      </p:grpSpPr>
+      <p:sp>
+        <p:nvSpPr>
+          <p:cNvPr id="2" name="Title 1"/>
+          <p:cNvSpPr>
+            <a:spLocks noGrp="1"/>
+          </p:cNvSpPr>
+          <p:nvPr>
+            <p:ph type="title"/>
+          </p:nvPr>
+        </p:nvSpPr>
+        <p:spPr/>
+        <p:txBody>
+          <a:bodyPr>
+            <a:normAutofit/>
+          </a:bodyPr>
+          <a:lstStyle/>
+          <a:p>
+            <a:r>
+              <a:rPr lang="en-US" dirty="0"/>
+              <a:t>Knowing to </a:t>
+            </a:r>
+            <a:r>
+              <a:rPr lang="en-US" dirty="0" err="1"/>
+              <a:t>Git</a:t>
+            </a:r>
+            <a:endParaRPr lang="en-US" dirty="0"/>
+          </a:p>
+        </p:txBody>
+      </p:sp>
+      <p:sp>
+        <p:nvSpPr>
+          <p:cNvPr id="3" name="Content Placeholder 2"/>
+          <p:cNvSpPr>
+            <a:spLocks noGrp="1"/>
+          </p:cNvSpPr>
+          <p:nvPr>
+            <p:ph sz="quarter" idx="1"/>
+          </p:nvPr>
+        </p:nvSpPr>
+        <p:spPr/>
+        <p:txBody>
+          <a:bodyPr>
+            <a:normAutofit/>
+          </a:bodyPr>
+          <a:lstStyle/>
+          <a:p>
+            <a:r>
+              <a:rPr lang="en-US" dirty="0" err="1" smtClean="0"/>
+              <a:t>Git</a:t>
+            </a:r>
+            <a:r>
+              <a:rPr lang="en-US" dirty="0" smtClean="0"/>
+              <a:t> checkout</a:t>
+            </a:r>
+            <a:endParaRPr lang="en-US" dirty="0" smtClean="0"/>
+          </a:p>
+          <a:p>
+            <a:endParaRPr lang="en-US" dirty="0" smtClean="0"/>
+          </a:p>
+          <a:p>
+            <a:endParaRPr lang="en-US" dirty="0" smtClean="0"/>
+          </a:p>
+        </p:txBody>
+      </p:sp>
+      <p:pic>
+        <p:nvPicPr>
+          <p:cNvPr id="6146" name="Picture 2"/>
+          <p:cNvPicPr>
+            <a:picLocks noChangeAspect="1" noChangeArrowheads="1"/>
+          </p:cNvPicPr>
+          <p:nvPr/>
+        </p:nvPicPr>
+        <p:blipFill>
+          <a:blip r:embed="rId2">
+            <a:extLst>
+              <a:ext uri="{28A0092B-C50C-407E-A947-70E740481C1C}">
+                <a14:useLocalDpi xmlns:a14="http://schemas.microsoft.com/office/drawing/2010/main" val="0"/>
+              </a:ext>
+            </a:extLst>
+          </a:blip>
+          <a:srcRect/>
+          <a:stretch>
+            <a:fillRect/>
+          </a:stretch>
+        </p:blipFill>
+        <p:spPr bwMode="auto">
+          <a:xfrm>
+            <a:off x="652463" y="1828800"/>
+            <a:ext cx="7839075" cy="3524250"/>
+          </a:xfrm>
+          <a:prstGeom prst="rect">
+            <a:avLst/>
+          </a:prstGeom>
+          <a:noFill/>
+          <a:ln>
+            <a:noFill/>
+          </a:ln>
+          <a:extLst>
+            <a:ext uri="{909E8E84-426E-40DD-AFC4-6F175D3DCCD1}">
+              <a14:hiddenFill xmlns:a14="http://schemas.microsoft.com/office/drawing/2010/main">
+                <a:solidFill>
+                  <a:schemeClr val="accent1"/>
+                </a:solidFill>
+              </a14:hiddenFill>
+            </a:ext>
+            <a:ext uri="{91240B29-F687-4F45-9708-019B960494DF}">
+              <a14:hiddenLine xmlns:a14="http://schemas.microsoft.com/office/drawing/2010/main" w="9525">
+                <a:solidFill>
+                  <a:schemeClr val="tx1"/>
+                </a:solidFill>
+                <a:miter lim="800000"/>
+                <a:headEnd/>
+                <a:tailEnd/>
+              </a14:hiddenLine>
+            </a:ext>
+          </a:extLst>
+        </p:spPr>
+      </p:pic>
+    </p:spTree>
+    <p:extLst>
+      <p:ext uri="{BB962C8B-B14F-4D97-AF65-F5344CB8AC3E}">
+        <p14:creationId xmlns:p14="http://schemas.microsoft.com/office/powerpoint/2010/main" val="1826692028"/>
+      </p:ext>
+    </p:extLst>
+  </p:cSld>
+  <p:clrMapOvr>
+    <a:masterClrMapping/>
+  </p:clrMapOvr>
+  <mc:AlternateContent xmlns:mc="http://schemas.openxmlformats.org/markup-compatibility/2006" xmlns:p14="http://schemas.microsoft.com/office/powerpoint/2010/main">
+    <mc:Choice Requires="p14">
+      <p:transition spd="slow" p14:dur="2000"/>
+    </mc:Choice>
+    <mc:Fallback xmlns="">
+      <p:transition spd="slow"/>
+    </mc:Fallback>
+  </mc:AlternateContent>
+</p:sld>
+</file>
+
+<file path=ppt/slides/slide11.xml><?xml version="1.0" encoding="utf-8"?>
+<p:sld xmlns:a="http://schemas.openxmlformats.org/drawingml/2006/main" xmlns:r="http://schemas.openxmlformats.org/officeDocument/2006/relationships" xmlns:p="http://schemas.openxmlformats.org/presentationml/2006/main">
+  <p:cSld>
+    <p:spTree>
+      <p:nvGrpSpPr>
+        <p:cNvPr id="1" name=""/>
+        <p:cNvGrpSpPr/>
+        <p:nvPr/>
+      </p:nvGrpSpPr>
+      <p:grpSpPr>
+        <a:xfrm>
+          <a:off x="0" y="0"/>
+          <a:ext cx="0" cy="0"/>
+          <a:chOff x="0" y="0"/>
+          <a:chExt cx="0" cy="0"/>
+        </a:xfrm>
+      </p:grpSpPr>
+      <p:sp>
+        <p:nvSpPr>
+          <p:cNvPr id="2" name="Title 1"/>
+          <p:cNvSpPr>
+            <a:spLocks noGrp="1"/>
+          </p:cNvSpPr>
+          <p:nvPr>
+            <p:ph type="title"/>
+          </p:nvPr>
+        </p:nvSpPr>
+        <p:spPr/>
+        <p:txBody>
+          <a:bodyPr>
+            <a:normAutofit/>
+          </a:bodyPr>
+          <a:lstStyle/>
+          <a:p>
+            <a:r>
+              <a:rPr lang="en-US" dirty="0"/>
+              <a:t>Knowing to </a:t>
+            </a:r>
+            <a:r>
+              <a:rPr lang="en-US" dirty="0" err="1"/>
+              <a:t>Git</a:t>
+            </a:r>
+            <a:endParaRPr lang="en-US" dirty="0"/>
+          </a:p>
+        </p:txBody>
+      </p:sp>
+      <p:sp>
+        <p:nvSpPr>
+          <p:cNvPr id="3" name="Content Placeholder 2"/>
+          <p:cNvSpPr>
+            <a:spLocks noGrp="1"/>
+          </p:cNvSpPr>
+          <p:nvPr>
+            <p:ph sz="quarter" idx="1"/>
+          </p:nvPr>
+        </p:nvSpPr>
+        <p:spPr/>
+        <p:txBody>
+          <a:bodyPr>
+            <a:normAutofit/>
+          </a:bodyPr>
+          <a:lstStyle/>
+          <a:p>
+            <a:r>
+              <a:rPr lang="en-US" dirty="0" err="1" smtClean="0"/>
+              <a:t>Git</a:t>
+            </a:r>
+            <a:r>
+              <a:rPr lang="en-US" dirty="0" smtClean="0"/>
+              <a:t> rebase</a:t>
+            </a:r>
+            <a:endParaRPr lang="en-US" dirty="0" smtClean="0"/>
+          </a:p>
+          <a:p>
+            <a:endParaRPr lang="en-US" dirty="0" smtClean="0"/>
+          </a:p>
+          <a:p>
+            <a:endParaRPr lang="en-US" dirty="0" smtClean="0"/>
+          </a:p>
+        </p:txBody>
+      </p:sp>
+      <p:pic>
+        <p:nvPicPr>
+          <p:cNvPr id="7170" name="Picture 2"/>
+          <p:cNvPicPr>
+            <a:picLocks noChangeAspect="1" noChangeArrowheads="1"/>
+          </p:cNvPicPr>
+          <p:nvPr/>
+        </p:nvPicPr>
+        <p:blipFill>
+          <a:blip r:embed="rId2">
+            <a:extLst>
+              <a:ext uri="{28A0092B-C50C-407E-A947-70E740481C1C}">
+                <a14:useLocalDpi xmlns:a14="http://schemas.microsoft.com/office/drawing/2010/main" val="0"/>
+              </a:ext>
+            </a:extLst>
+          </a:blip>
+          <a:srcRect/>
+          <a:stretch>
+            <a:fillRect/>
+          </a:stretch>
+        </p:blipFill>
+        <p:spPr bwMode="auto">
+          <a:xfrm>
+            <a:off x="2214563" y="2047875"/>
+            <a:ext cx="4714875" cy="2762250"/>
+          </a:xfrm>
+          <a:prstGeom prst="rect">
+            <a:avLst/>
+          </a:prstGeom>
+          <a:noFill/>
+          <a:ln>
+            <a:noFill/>
+          </a:ln>
+          <a:extLst>
+            <a:ext uri="{909E8E84-426E-40DD-AFC4-6F175D3DCCD1}">
+              <a14:hiddenFill xmlns:a14="http://schemas.microsoft.com/office/drawing/2010/main">
+                <a:solidFill>
+                  <a:schemeClr val="accent1"/>
+                </a:solidFill>
+              </a14:hiddenFill>
+            </a:ext>
+            <a:ext uri="{91240B29-F687-4F45-9708-019B960494DF}">
+              <a14:hiddenLine xmlns:a14="http://schemas.microsoft.com/office/drawing/2010/main" w="9525">
+                <a:solidFill>
+                  <a:schemeClr val="tx1"/>
+                </a:solidFill>
+                <a:miter lim="800000"/>
+                <a:headEnd/>
+                <a:tailEnd/>
+              </a14:hiddenLine>
+            </a:ext>
+          </a:extLst>
+        </p:spPr>
+      </p:pic>
+    </p:spTree>
+    <p:extLst>
+      <p:ext uri="{BB962C8B-B14F-4D97-AF65-F5344CB8AC3E}">
+        <p14:creationId xmlns:p14="http://schemas.microsoft.com/office/powerpoint/2010/main" val="1145785362"/>
+      </p:ext>
+    </p:extLst>
+  </p:cSld>
+  <p:clrMapOvr>
+    <a:masterClrMapping/>
+  </p:clrMapOvr>
+  <mc:AlternateContent xmlns:mc="http://schemas.openxmlformats.org/markup-compatibility/2006" xmlns:p14="http://schemas.microsoft.com/office/powerpoint/2010/main">
+    <mc:Choice Requires="p14">
+      <p:transition spd="slow" p14:dur="2000"/>
+    </mc:Choice>
+    <mc:Fallback xmlns="">
+      <p:transition spd="slow"/>
+    </mc:Fallback>
+  </mc:AlternateContent>
+</p:sld>
+</file>
+
+<file path=ppt/slides/slide12.xml><?xml version="1.0" encoding="utf-8"?>
+<p:sld xmlns:a="http://schemas.openxmlformats.org/drawingml/2006/main" xmlns:r="http://schemas.openxmlformats.org/officeDocument/2006/relationships" xmlns:p="http://schemas.openxmlformats.org/presentationml/2006/main">
+  <p:cSld>
+    <p:spTree>
+      <p:nvGrpSpPr>
+        <p:cNvPr id="1" name=""/>
+        <p:cNvGrpSpPr/>
+        <p:nvPr/>
+      </p:nvGrpSpPr>
+      <p:grpSpPr>
+        <a:xfrm>
+          <a:off x="0" y="0"/>
+          <a:ext cx="0" cy="0"/>
+          <a:chOff x="0" y="0"/>
+          <a:chExt cx="0" cy="0"/>
+        </a:xfrm>
+      </p:grpSpPr>
+      <p:sp>
+        <p:nvSpPr>
+          <p:cNvPr id="2" name="Title 1"/>
+          <p:cNvSpPr>
+            <a:spLocks noGrp="1"/>
+          </p:cNvSpPr>
+          <p:nvPr>
+            <p:ph type="title"/>
+          </p:nvPr>
+        </p:nvSpPr>
+        <p:spPr/>
+        <p:txBody>
+          <a:bodyPr>
+            <a:normAutofit/>
+          </a:bodyPr>
+          <a:lstStyle/>
+          <a:p>
+            <a:r>
+              <a:rPr lang="en-US" dirty="0"/>
+              <a:t>Knowing to </a:t>
+            </a:r>
+            <a:r>
+              <a:rPr lang="en-US" dirty="0" err="1"/>
+              <a:t>Git</a:t>
+            </a:r>
+            <a:endParaRPr lang="en-US" dirty="0"/>
+          </a:p>
+        </p:txBody>
+      </p:sp>
+      <p:sp>
+        <p:nvSpPr>
+          <p:cNvPr id="3" name="Content Placeholder 2"/>
+          <p:cNvSpPr>
+            <a:spLocks noGrp="1"/>
+          </p:cNvSpPr>
+          <p:nvPr>
+            <p:ph sz="quarter" idx="1"/>
+          </p:nvPr>
+        </p:nvSpPr>
+        <p:spPr/>
+        <p:txBody>
+          <a:bodyPr>
+            <a:normAutofit/>
+          </a:bodyPr>
+          <a:lstStyle/>
+          <a:p>
+            <a:r>
+              <a:rPr lang="en-US" dirty="0" err="1" smtClean="0"/>
+              <a:t>Git</a:t>
+            </a:r>
+            <a:r>
+              <a:rPr lang="en-US" dirty="0" smtClean="0"/>
+              <a:t> stash(save your work temporary and clean work directory)</a:t>
+            </a:r>
+          </a:p>
+          <a:p>
+            <a:pPr marL="0" indent="0">
+              <a:buNone/>
+            </a:pPr>
+            <a:r>
+              <a:rPr lang="en-US" sz="1200" dirty="0" smtClean="0"/>
+              <a:t>.</a:t>
+            </a:r>
+            <a:r>
+              <a:rPr lang="en-US" sz="1200" dirty="0" err="1" smtClean="0"/>
+              <a:t>git</a:t>
+            </a:r>
+            <a:r>
+              <a:rPr lang="en-US" sz="1200" dirty="0" smtClean="0"/>
+              <a:t>/refs/stash</a:t>
+            </a:r>
+          </a:p>
+          <a:p>
+            <a:r>
+              <a:rPr lang="en-US" dirty="0" err="1"/>
+              <a:t>Git</a:t>
+            </a:r>
+            <a:r>
+              <a:rPr lang="en-US" dirty="0"/>
+              <a:t> </a:t>
+            </a:r>
+            <a:r>
+              <a:rPr lang="en-US" dirty="0" err="1" smtClean="0"/>
+              <a:t>reflog</a:t>
+            </a:r>
+            <a:r>
+              <a:rPr lang="en-US" dirty="0" smtClean="0"/>
+              <a:t>(find lost commit)</a:t>
+            </a:r>
+            <a:endParaRPr lang="en-US" dirty="0"/>
+          </a:p>
+          <a:p>
+            <a:pPr marL="0" indent="0">
+              <a:buNone/>
+            </a:pPr>
+            <a:r>
+              <a:rPr lang="en-US" sz="1200" dirty="0"/>
+              <a:t>.</a:t>
+            </a:r>
+            <a:r>
+              <a:rPr lang="en-US" sz="1200" dirty="0" err="1" smtClean="0"/>
+              <a:t>git</a:t>
+            </a:r>
+            <a:r>
+              <a:rPr lang="en-US" sz="1200" dirty="0" smtClean="0"/>
+              <a:t>\logs\refs\heads\master</a:t>
+            </a:r>
+            <a:endParaRPr lang="en-US" sz="1200" dirty="0"/>
+          </a:p>
+          <a:p>
+            <a:pPr marL="0" indent="0">
+              <a:buNone/>
+            </a:pPr>
+            <a:endParaRPr lang="en-US" dirty="0" smtClean="0"/>
+          </a:p>
+        </p:txBody>
+      </p:sp>
+    </p:spTree>
+    <p:extLst>
+      <p:ext uri="{BB962C8B-B14F-4D97-AF65-F5344CB8AC3E}">
+        <p14:creationId xmlns:p14="http://schemas.microsoft.com/office/powerpoint/2010/main" val="4256057530"/>
+      </p:ext>
+    </p:extLst>
+  </p:cSld>
+  <p:clrMapOvr>
+    <a:masterClrMapping/>
+  </p:clrMapOvr>
+  <mc:AlternateContent xmlns:mc="http://schemas.openxmlformats.org/markup-compatibility/2006" xmlns:p14="http://schemas.microsoft.com/office/powerpoint/2010/main">
+    <mc:Choice Requires="p14">
+      <p:transition spd="slow" p14:dur="2000"/>
+    </mc:Choice>
+    <mc:Fallback xmlns="">
+      <p:transition spd="slow"/>
+    </mc:Fallback>
+  </mc:AlternateContent>
+</p:sld>
+</file>
+
+<file path=ppt/slides/slide13.xml><?xml version="1.0" encoding="utf-8"?>
+<p:sld xmlns:a="http://schemas.openxmlformats.org/drawingml/2006/main" xmlns:r="http://schemas.openxmlformats.org/officeDocument/2006/relationships" xmlns:p="http://schemas.openxmlformats.org/presentationml/2006/main">
+  <p:cSld>
+    <p:spTree>
+      <p:nvGrpSpPr>
+        <p:cNvPr id="1" name=""/>
+        <p:cNvGrpSpPr/>
+        <p:nvPr/>
+      </p:nvGrpSpPr>
+      <p:grpSpPr>
+        <a:xfrm>
+          <a:off x="0" y="0"/>
+          <a:ext cx="0" cy="0"/>
+          <a:chOff x="0" y="0"/>
+          <a:chExt cx="0" cy="0"/>
+        </a:xfrm>
+      </p:grpSpPr>
+      <p:sp>
+        <p:nvSpPr>
+          <p:cNvPr id="2" name="Title 1"/>
+          <p:cNvSpPr>
+            <a:spLocks noGrp="1"/>
+          </p:cNvSpPr>
+          <p:nvPr>
+            <p:ph type="title"/>
+          </p:nvPr>
+        </p:nvSpPr>
+        <p:spPr/>
+        <p:txBody>
+          <a:bodyPr/>
+          <a:lstStyle/>
+          <a:p>
+            <a:r>
+              <a:rPr lang="en-US" dirty="0" smtClean="0"/>
+              <a:t>Work with </a:t>
+            </a:r>
+            <a:r>
+              <a:rPr lang="en-US" dirty="0" err="1" smtClean="0"/>
+              <a:t>Git</a:t>
+            </a:r>
+            <a:endParaRPr lang="en-US" dirty="0"/>
+          </a:p>
+        </p:txBody>
+      </p:sp>
+      <p:sp>
+        <p:nvSpPr>
+          <p:cNvPr id="3" name="Content Placeholder 2"/>
+          <p:cNvSpPr>
+            <a:spLocks noGrp="1"/>
+          </p:cNvSpPr>
+          <p:nvPr>
+            <p:ph sz="quarter" idx="1"/>
+          </p:nvPr>
+        </p:nvSpPr>
+        <p:spPr/>
+        <p:txBody>
+          <a:bodyPr>
+            <a:normAutofit fontScale="55000" lnSpcReduction="20000"/>
+          </a:bodyPr>
+          <a:lstStyle/>
+          <a:p>
+            <a:r>
+              <a:rPr lang="en-US" sz="1600" dirty="0" err="1" smtClean="0"/>
+              <a:t>Git</a:t>
+            </a:r>
+            <a:r>
+              <a:rPr lang="en-US" sz="1600" dirty="0" smtClean="0"/>
+              <a:t> log: alias(</a:t>
+            </a:r>
+            <a:r>
+              <a:rPr lang="en-US" sz="1600" dirty="0" err="1" smtClean="0"/>
+              <a:t>sl</a:t>
+            </a:r>
+            <a:r>
+              <a:rPr lang="en-US" sz="1600" dirty="0" smtClean="0"/>
+              <a:t>, </a:t>
+            </a:r>
+            <a:r>
+              <a:rPr lang="en-US" sz="1600" dirty="0" err="1" smtClean="0"/>
+              <a:t>slg</a:t>
+            </a:r>
+            <a:r>
+              <a:rPr lang="en-US" sz="1600" dirty="0" smtClean="0"/>
+              <a:t>)</a:t>
+            </a:r>
+          </a:p>
+          <a:p>
+            <a:r>
+              <a:rPr lang="en-US" sz="1600" dirty="0" err="1" smtClean="0"/>
+              <a:t>Git</a:t>
+            </a:r>
+            <a:r>
+              <a:rPr lang="en-US" sz="1600" dirty="0" smtClean="0"/>
+              <a:t> status: alias(</a:t>
+            </a:r>
+            <a:r>
+              <a:rPr lang="en-US" sz="1600" dirty="0" err="1" smtClean="0"/>
+              <a:t>ss</a:t>
+            </a:r>
+            <a:r>
+              <a:rPr lang="en-US" sz="1600" dirty="0" smtClean="0"/>
+              <a:t>)</a:t>
+            </a:r>
+          </a:p>
+          <a:p>
+            <a:r>
+              <a:rPr lang="en-US" sz="1600" dirty="0" err="1" smtClean="0"/>
+              <a:t>Git</a:t>
+            </a:r>
+            <a:r>
+              <a:rPr lang="en-US" sz="1600" dirty="0" smtClean="0"/>
+              <a:t> show: alias (s)</a:t>
+            </a:r>
+          </a:p>
+          <a:p>
+            <a:r>
+              <a:rPr lang="en-US" sz="1600" dirty="0" err="1" smtClean="0"/>
+              <a:t>Git</a:t>
+            </a:r>
+            <a:r>
+              <a:rPr lang="en-US" sz="1600" dirty="0" smtClean="0"/>
+              <a:t> add: alias(au)</a:t>
+            </a:r>
+          </a:p>
+          <a:p>
+            <a:r>
+              <a:rPr lang="en-US" sz="1600" dirty="0" err="1" smtClean="0"/>
+              <a:t>Git</a:t>
+            </a:r>
+            <a:r>
+              <a:rPr lang="en-US" sz="1600" dirty="0" smtClean="0"/>
+              <a:t> ls-files: alias(lf)</a:t>
+            </a:r>
+          </a:p>
+          <a:p>
+            <a:r>
+              <a:rPr lang="en-US" sz="1600" dirty="0" err="1" smtClean="0"/>
+              <a:t>Git</a:t>
+            </a:r>
+            <a:r>
+              <a:rPr lang="en-US" sz="1600" dirty="0" smtClean="0"/>
+              <a:t> branch: alias(</a:t>
+            </a:r>
+            <a:r>
+              <a:rPr lang="en-US" sz="1600" dirty="0" err="1" smtClean="0"/>
+              <a:t>lb</a:t>
+            </a:r>
+            <a:r>
+              <a:rPr lang="en-US" sz="1600" dirty="0" smtClean="0"/>
+              <a:t>, </a:t>
+            </a:r>
+            <a:r>
+              <a:rPr lang="en-US" sz="1600" dirty="0" err="1" smtClean="0"/>
+              <a:t>lba,gpb</a:t>
+            </a:r>
+            <a:r>
+              <a:rPr lang="en-US" sz="1600" dirty="0"/>
+              <a:t>)</a:t>
+            </a:r>
+            <a:endParaRPr lang="en-US" sz="1600" dirty="0" smtClean="0"/>
+          </a:p>
+          <a:p>
+            <a:r>
+              <a:rPr lang="en-US" sz="1600" dirty="0" err="1" smtClean="0"/>
+              <a:t>Git</a:t>
+            </a:r>
+            <a:r>
+              <a:rPr lang="en-US" sz="1600" dirty="0" smtClean="0"/>
+              <a:t> blame: alias(</a:t>
+            </a:r>
+            <a:r>
+              <a:rPr lang="en-US" sz="1600" dirty="0" err="1" smtClean="0"/>
+              <a:t>blm</a:t>
+            </a:r>
+            <a:r>
+              <a:rPr lang="en-US" sz="1600" dirty="0" smtClean="0"/>
+              <a:t>)</a:t>
+            </a:r>
+          </a:p>
+          <a:p>
+            <a:r>
+              <a:rPr lang="en-US" sz="1600" dirty="0" err="1" smtClean="0"/>
+              <a:t>Git</a:t>
+            </a:r>
+            <a:r>
+              <a:rPr lang="en-US" sz="1600" dirty="0" smtClean="0"/>
+              <a:t> commit: alias(cm)</a:t>
+            </a:r>
+          </a:p>
+          <a:p>
+            <a:r>
+              <a:rPr lang="en-US" sz="1600" dirty="0" err="1" smtClean="0"/>
+              <a:t>Git</a:t>
+            </a:r>
+            <a:r>
+              <a:rPr lang="en-US" sz="1600" dirty="0" smtClean="0"/>
+              <a:t> checkout: alias(co)</a:t>
+            </a:r>
+          </a:p>
+          <a:p>
+            <a:r>
+              <a:rPr lang="en-US" sz="1600" dirty="0" err="1" smtClean="0"/>
+              <a:t>Git</a:t>
+            </a:r>
+            <a:r>
+              <a:rPr lang="en-US" sz="1600" dirty="0" smtClean="0"/>
+              <a:t> diff: alias(</a:t>
+            </a:r>
+            <a:r>
+              <a:rPr lang="en-US" sz="1600" dirty="0" err="1" smtClean="0"/>
+              <a:t>df,dfc</a:t>
+            </a:r>
+            <a:r>
+              <a:rPr lang="en-US" sz="1600" dirty="0" smtClean="0"/>
+              <a:t>)</a:t>
+            </a:r>
+          </a:p>
+          <a:p>
+            <a:r>
+              <a:rPr lang="en-US" sz="1600" dirty="0" err="1" smtClean="0"/>
+              <a:t>Git</a:t>
+            </a:r>
+            <a:r>
+              <a:rPr lang="en-US" sz="1600" dirty="0" smtClean="0"/>
+              <a:t> grep: alias(</a:t>
+            </a:r>
+            <a:r>
+              <a:rPr lang="en-US" sz="1600" dirty="0" err="1" smtClean="0"/>
+              <a:t>gp</a:t>
+            </a:r>
+            <a:r>
+              <a:rPr lang="en-US" sz="1600" dirty="0" smtClean="0"/>
+              <a:t>)</a:t>
+            </a:r>
+          </a:p>
+          <a:p>
+            <a:r>
+              <a:rPr lang="en-US" sz="1600" dirty="0" err="1" smtClean="0"/>
+              <a:t>Git</a:t>
+            </a:r>
+            <a:r>
+              <a:rPr lang="en-US" sz="1600" dirty="0" smtClean="0"/>
+              <a:t> </a:t>
+            </a:r>
+            <a:r>
+              <a:rPr lang="en-US" sz="1600" dirty="0" err="1" smtClean="0"/>
+              <a:t>merge:alias</a:t>
+            </a:r>
+            <a:r>
+              <a:rPr lang="en-US" sz="1600" dirty="0" smtClean="0"/>
+              <a:t>(mg)</a:t>
+            </a:r>
+          </a:p>
+          <a:p>
+            <a:r>
+              <a:rPr lang="en-US" sz="1600" dirty="0" err="1" smtClean="0"/>
+              <a:t>Git</a:t>
+            </a:r>
+            <a:r>
+              <a:rPr lang="en-US" sz="1600" dirty="0" smtClean="0"/>
+              <a:t> </a:t>
+            </a:r>
+            <a:r>
+              <a:rPr lang="en-US" sz="1600" dirty="0" err="1" smtClean="0"/>
+              <a:t>fetch:alias</a:t>
+            </a:r>
+            <a:r>
+              <a:rPr lang="en-US" sz="1600" dirty="0" smtClean="0"/>
+              <a:t>(f)</a:t>
+            </a:r>
+          </a:p>
+          <a:p>
+            <a:r>
+              <a:rPr lang="en-US" sz="1600" dirty="0" err="1" smtClean="0"/>
+              <a:t>Git</a:t>
+            </a:r>
+            <a:r>
+              <a:rPr lang="en-US" sz="1600" dirty="0" smtClean="0"/>
+              <a:t> </a:t>
+            </a:r>
+            <a:r>
+              <a:rPr lang="en-US" sz="1600" dirty="0" err="1" smtClean="0"/>
+              <a:t>pull:alias</a:t>
+            </a:r>
+            <a:r>
+              <a:rPr lang="en-US" sz="1600" dirty="0" smtClean="0"/>
+              <a:t>(p)</a:t>
+            </a:r>
+          </a:p>
+          <a:p>
+            <a:r>
+              <a:rPr lang="en-US" sz="1600" dirty="0" err="1" smtClean="0"/>
+              <a:t>Git</a:t>
+            </a:r>
+            <a:r>
+              <a:rPr lang="en-US" sz="1600" dirty="0" smtClean="0"/>
+              <a:t> push origin :alias(</a:t>
+            </a:r>
+            <a:r>
+              <a:rPr lang="en-US" sz="1600" dirty="0" err="1" smtClean="0"/>
+              <a:t>po</a:t>
+            </a:r>
+            <a:r>
+              <a:rPr lang="en-US" sz="1600" dirty="0" smtClean="0"/>
+              <a:t>)</a:t>
+            </a:r>
+          </a:p>
+          <a:p>
+            <a:r>
+              <a:rPr lang="en-US" sz="1600" dirty="0" err="1" smtClean="0"/>
+              <a:t>Git</a:t>
+            </a:r>
+            <a:r>
+              <a:rPr lang="en-US" sz="1600" dirty="0" smtClean="0"/>
+              <a:t> </a:t>
+            </a:r>
+            <a:r>
+              <a:rPr lang="en-US" sz="1600" dirty="0" err="1" smtClean="0"/>
+              <a:t>cherry-pick:alias</a:t>
+            </a:r>
+            <a:r>
+              <a:rPr lang="en-US" sz="1600" dirty="0" smtClean="0"/>
+              <a:t>(</a:t>
+            </a:r>
+            <a:r>
+              <a:rPr lang="en-US" sz="1600" dirty="0" err="1" smtClean="0"/>
+              <a:t>chp</a:t>
+            </a:r>
+            <a:r>
+              <a:rPr lang="en-US" sz="1600" dirty="0" smtClean="0"/>
+              <a:t>)</a:t>
+            </a:r>
+          </a:p>
+          <a:p>
+            <a:endParaRPr lang="en-US" sz="1600" dirty="0"/>
+          </a:p>
+          <a:p>
+            <a:r>
+              <a:rPr lang="en-US" sz="1600" dirty="0" smtClean="0"/>
+              <a:t>Another useful script for </a:t>
+            </a:r>
+            <a:r>
+              <a:rPr lang="en-US" sz="1600" dirty="0" err="1" smtClean="0"/>
+              <a:t>formating</a:t>
+            </a:r>
+            <a:r>
+              <a:rPr lang="en-US" sz="1600" dirty="0" smtClean="0"/>
+              <a:t> patch:</a:t>
+            </a:r>
+          </a:p>
+          <a:p>
+            <a:pPr marL="0" indent="0">
+              <a:buNone/>
+            </a:pPr>
+            <a:r>
+              <a:rPr lang="en-US" sz="1600" dirty="0" smtClean="0"/>
+              <a:t>alias </a:t>
+            </a:r>
+            <a:r>
+              <a:rPr lang="en-US" sz="1600" dirty="0" err="1"/>
+              <a:t>fp</a:t>
+            </a:r>
+            <a:r>
+              <a:rPr lang="en-US" sz="1600" dirty="0"/>
+              <a:t>='</a:t>
+            </a:r>
+            <a:r>
+              <a:rPr lang="en-US" sz="1600" dirty="0" err="1"/>
+              <a:t>perl</a:t>
+            </a:r>
+            <a:r>
+              <a:rPr lang="en-US" sz="1600" dirty="0"/>
+              <a:t>  -</a:t>
+            </a:r>
+            <a:r>
+              <a:rPr lang="en-US" sz="1600" dirty="0" err="1"/>
+              <a:t>i.bak</a:t>
+            </a:r>
+            <a:r>
+              <a:rPr lang="en-US" sz="1600" dirty="0"/>
+              <a:t> -</a:t>
+            </a:r>
+            <a:r>
+              <a:rPr lang="en-US" sz="1600" dirty="0" err="1"/>
+              <a:t>pe</a:t>
+            </a:r>
+            <a:r>
+              <a:rPr lang="en-US" sz="1600" dirty="0"/>
+              <a:t> "s/(</a:t>
+            </a:r>
+            <a:r>
+              <a:rPr lang="en-US" sz="1600" dirty="0" err="1"/>
+              <a:t>if|for|while</a:t>
+            </a:r>
+            <a:r>
+              <a:rPr lang="en-US" sz="1600" dirty="0"/>
+              <a:t>)\(/\1 \(/ if/^\+/;</a:t>
+            </a:r>
+          </a:p>
+          <a:p>
+            <a:pPr marL="0" indent="0">
+              <a:buNone/>
+            </a:pPr>
+            <a:r>
+              <a:rPr lang="en-US" sz="1600" dirty="0"/>
+              <a:t>                             s/(?&lt;! )(?&lt;!&lt;)(?&lt;!&gt;)(?&lt;!-)(?&lt;!=)(?&lt;!!)(==|&lt;|&gt;)/ \1/g if/^\+\s*(else)?\s*if/;</a:t>
+            </a:r>
+          </a:p>
+          <a:p>
+            <a:pPr marL="0" indent="0">
+              <a:buNone/>
+            </a:pPr>
+            <a:r>
+              <a:rPr lang="en-US" sz="1600" dirty="0"/>
+              <a:t>                             s/(==|&lt;|&gt;)(?! )(?&lt;!&lt;)(?&lt;!&gt;)(?!-)(?!=)(?!!)/\1 /g if/^\+\s*(else)?\s*if/;</a:t>
+            </a:r>
+          </a:p>
+          <a:p>
+            <a:pPr marL="0" indent="0">
+              <a:buNone/>
+            </a:pPr>
+            <a:r>
+              <a:rPr lang="en-US" sz="1600" dirty="0"/>
+              <a:t>                             s/\)\{/\) \{/g if/^\+/;</a:t>
+            </a:r>
+          </a:p>
+          <a:p>
+            <a:pPr marL="0" indent="0">
+              <a:buNone/>
+            </a:pPr>
+            <a:r>
+              <a:rPr lang="en-US" sz="1600" dirty="0"/>
+              <a:t>                             s/\t/    /g if/^\+/;</a:t>
+            </a:r>
+          </a:p>
+          <a:p>
+            <a:pPr marL="0" indent="0">
+              <a:buNone/>
+            </a:pPr>
+            <a:r>
+              <a:rPr lang="en-US" sz="1600" dirty="0"/>
+              <a:t>                             s/[ ]+(?=\r|\n)// if /^\+/;</a:t>
+            </a:r>
+          </a:p>
+          <a:p>
+            <a:pPr marL="0" indent="0">
+              <a:buNone/>
+            </a:pPr>
+            <a:r>
+              <a:rPr lang="en-US" sz="1600" dirty="0"/>
+              <a:t>                             " '</a:t>
+            </a:r>
+            <a:endParaRPr lang="en-US" sz="1600" dirty="0" smtClean="0"/>
+          </a:p>
+        </p:txBody>
+      </p:sp>
+    </p:spTree>
+    <p:extLst>
+      <p:ext uri="{BB962C8B-B14F-4D97-AF65-F5344CB8AC3E}">
+        <p14:creationId xmlns:p14="http://schemas.microsoft.com/office/powerpoint/2010/main" val="2911417084"/>
+      </p:ext>
+    </p:extLst>
+  </p:cSld>
+  <p:clrMapOvr>
+    <a:masterClrMapping/>
+  </p:clrMapOvr>
+  <mc:AlternateContent xmlns:mc="http://schemas.openxmlformats.org/markup-compatibility/2006" xmlns:p14="http://schemas.microsoft.com/office/powerpoint/2010/main">
+    <mc:Choice Requires="p14">
+      <p:transition spd="slow" p14:dur="2000"/>
+    </mc:Choice>
+    <mc:Fallback xmlns="">
+      <p:transition spd="slow"/>
+    </mc:Fallback>
+  </mc:AlternateContent>
+</p:sld>
+</file>
+
+<file path=ppt/slides/slide14.xml><?xml version="1.0" encoding="utf-8"?>
+<p:sld xmlns:a="http://schemas.openxmlformats.org/drawingml/2006/main" xmlns:r="http://schemas.openxmlformats.org/officeDocument/2006/relationships" xmlns:p="http://schemas.openxmlformats.org/presentationml/2006/main">
+  <p:cSld>
+    <p:spTree>
+      <p:nvGrpSpPr>
+        <p:cNvPr id="1" name=""/>
+        <p:cNvGrpSpPr/>
+        <p:nvPr/>
+      </p:nvGrpSpPr>
+      <p:grpSpPr>
+        <a:xfrm>
+          <a:off x="0" y="0"/>
+          <a:ext cx="0" cy="0"/>
+          <a:chOff x="0" y="0"/>
+          <a:chExt cx="0" cy="0"/>
+        </a:xfrm>
+      </p:grpSpPr>
+      <p:sp>
+        <p:nvSpPr>
+          <p:cNvPr id="3" name="Content Placeholder 2"/>
+          <p:cNvSpPr>
+            <a:spLocks noGrp="1"/>
+          </p:cNvSpPr>
+          <p:nvPr>
+            <p:ph sz="quarter" idx="1"/>
+          </p:nvPr>
+        </p:nvSpPr>
+        <p:spPr/>
+        <p:txBody>
+          <a:bodyPr>
+            <a:normAutofit/>
+          </a:bodyPr>
+          <a:lstStyle/>
+          <a:p>
+            <a:pPr marL="0" indent="0" algn="ctr">
+              <a:buNone/>
+            </a:pPr>
+            <a:endParaRPr lang="en-US" dirty="0" smtClean="0"/>
+          </a:p>
+          <a:p>
+            <a:pPr marL="0" indent="0" algn="ctr">
+              <a:buNone/>
+            </a:pPr>
+            <a:endParaRPr lang="en-US" dirty="0"/>
+          </a:p>
+          <a:p>
+            <a:pPr marL="0" indent="0" algn="ctr">
+              <a:buNone/>
+            </a:pPr>
+            <a:endParaRPr lang="en-US" dirty="0" smtClean="0"/>
+          </a:p>
+          <a:p>
+            <a:pPr marL="0" indent="0" algn="ctr">
+              <a:buNone/>
+            </a:pPr>
+            <a:endParaRPr lang="en-US" dirty="0"/>
+          </a:p>
+          <a:p>
+            <a:pPr marL="0" indent="0" algn="ctr">
+              <a:buNone/>
+            </a:pPr>
+            <a:r>
+              <a:rPr lang="en-US" dirty="0" smtClean="0"/>
+              <a:t>Thank you.</a:t>
+            </a:r>
+          </a:p>
+          <a:p>
+            <a:pPr marL="0" indent="0" algn="ctr">
+              <a:buNone/>
+            </a:pPr>
+            <a:r>
+              <a:rPr lang="en-US" sz="1200" dirty="0" smtClean="0"/>
+              <a:t>                                                           </a:t>
+            </a:r>
+          </a:p>
+          <a:p>
+            <a:pPr marL="0" indent="0" algn="ctr">
+              <a:buNone/>
+            </a:pPr>
+            <a:endParaRPr lang="en-US" sz="1200" dirty="0"/>
+          </a:p>
+          <a:p>
+            <a:pPr marL="0" indent="0" algn="ctr">
+              <a:buNone/>
+            </a:pPr>
+            <a:endParaRPr lang="en-US" sz="1200" dirty="0" smtClean="0"/>
+          </a:p>
+          <a:p>
+            <a:pPr marL="0" indent="0" algn="ctr">
+              <a:buNone/>
+            </a:pPr>
+            <a:endParaRPr lang="en-US" sz="1200" dirty="0"/>
+          </a:p>
+          <a:p>
+            <a:pPr marL="0" indent="0" algn="ctr">
+              <a:buNone/>
+            </a:pPr>
+            <a:r>
+              <a:rPr lang="en-US" sz="1200" b="1" dirty="0" smtClean="0"/>
+              <a:t>04/12/2015</a:t>
+            </a:r>
+            <a:endParaRPr lang="en-US" sz="1200" b="1" dirty="0"/>
+          </a:p>
+        </p:txBody>
+      </p:sp>
+      <p:sp>
+        <p:nvSpPr>
+          <p:cNvPr id="2" name="Title 1"/>
+          <p:cNvSpPr>
+            <a:spLocks noGrp="1"/>
+          </p:cNvSpPr>
+          <p:nvPr>
+            <p:ph type="title"/>
+          </p:nvPr>
+        </p:nvSpPr>
+        <p:spPr/>
+        <p:txBody>
+          <a:bodyPr/>
+          <a:lstStyle/>
+          <a:p>
+            <a:r>
+              <a:rPr lang="en-US" dirty="0" smtClean="0"/>
+              <a:t>Q&amp;A</a:t>
+            </a:r>
+            <a:endParaRPr lang="en-US" dirty="0"/>
+          </a:p>
+        </p:txBody>
+      </p:sp>
+    </p:spTree>
+    <p:extLst>
+      <p:ext uri="{BB962C8B-B14F-4D97-AF65-F5344CB8AC3E}">
+        <p14:creationId xmlns:p14="http://schemas.microsoft.com/office/powerpoint/2010/main" val="1395885057"/>
+      </p:ext>
+    </p:extLst>
+  </p:cSld>
+  <p:clrMapOvr>
+    <a:masterClrMapping/>
+  </p:clrMapOvr>
+  <mc:AlternateContent xmlns:mc="http://schemas.openxmlformats.org/markup-compatibility/2006" xmlns:p14="http://schemas.microsoft.com/office/powerpoint/2010/main">
+    <mc:Choice Requires="p14">
+      <p:transition spd="slow" p14:dur="2000"/>
+    </mc:Choice>
+    <mc:Fallback xmlns="">
+      <p:transition spd="slow"/>
+    </mc:Fallback>
+  </mc:AlternateContent>
+  <p:timing>
+    <p:tnLst>
+      <p:par>
+        <p:cTn id="1" dur="indefinite" restart="never" nodeType="tmRoot"/>
+      </p:par>
+    </p:tnLst>
+  </p:timing>
+</p:sld>
+</file>
+
 <file path=ppt/slides/slide2.xml><?xml version="1.0" encoding="utf-8"?>
 <p:sld xmlns:a="http://schemas.openxmlformats.org/drawingml/2006/main" xmlns:r="http://schemas.openxmlformats.org/officeDocument/2006/relationships" xmlns:p="http://schemas.openxmlformats.org/presentationml/2006/main">
   <p:cSld>
@@ -3929,7 +5038,7 @@
           <a:p>
             <a:r>
               <a:rPr lang="en-US" dirty="0" smtClean="0"/>
-              <a:t>Setup </a:t>
+              <a:t>Connect </a:t>
             </a:r>
             <a:r>
               <a:rPr lang="en-US" dirty="0" err="1" smtClean="0"/>
@@ -3937,7 +5046,11 @@
             </a:r>
             <a:r>
               <a:rPr lang="en-US" dirty="0" smtClean="0"/>
-              <a:t> to Stash and Shortcuts</a:t>
+              <a:t> </a:t>
+            </a:r>
+            <a:r>
+              <a:rPr lang="en-US" dirty="0" smtClean="0"/>
+              <a:t>to Stash and Shortcuts</a:t>
             </a:r>
           </a:p>
           <a:p>
@@ -4057,8 +5170,12 @@
           <a:lstStyle/>
           <a:p>
             <a:r>
-              <a:rPr lang="en-US" dirty="0"/>
-              <a:t>Setup </a:t>
+              <a:rPr lang="en-US" dirty="0" smtClean="0"/>
+              <a:t>Connect</a:t>
+            </a:r>
+            <a:r>
+              <a:rPr lang="en-US" dirty="0" smtClean="0"/>
+              <a:t> </a:t>
             </a:r>
             <a:r>
               <a:rPr lang="en-US" dirty="0" err="1"/>
@@ -4593,11 +5710,19 @@
           <a:p>
             <a:r>
               <a:rPr lang="en-US" dirty="0" smtClean="0"/>
-              <a:t>Working area, Staging area, and </a:t>
+              <a:t>Working </a:t>
             </a:r>
             <a:r>
               <a:rPr lang="en-US" dirty="0" smtClean="0"/>
-              <a:t>repository</a:t>
+              <a:t>directory</a:t>
+            </a:r>
+            <a:r>
+              <a:rPr lang="en-US" dirty="0" smtClean="0"/>
+              <a:t>, </a:t>
+            </a:r>
+            <a:r>
+              <a:rPr lang="en-US" dirty="0" smtClean="0"/>
+              <a:t>Staging area, and repository</a:t>
             </a:r>
           </a:p>
           <a:p>
@@ -4608,6 +5733,60 @@
           </a:p>
         </p:txBody>
       </p:sp>
+      <p:pic>
+        <p:nvPicPr>
+          <p:cNvPr id="1027" name="Picture 3"/>
+          <p:cNvPicPr>
+            <a:picLocks noChangeAspect="1" noChangeArrowheads="1"/>
+          </p:cNvPicPr>
+          <p:nvPr/>
+        </p:nvPicPr>
+        <p:blipFill>
+          <a:blip r:embed="rId2">
+            <a:extLst>
+              <a:ext uri="{28A0092B-C50C-407E-A947-70E740481C1C}">
+                <a14:useLocalDpi xmlns:a14="http://schemas.microsoft.com/office/drawing/2010/main" val="0"/>
+              </a:ext>
+            </a:extLst>
+          </a:blip>
+          <a:srcRect/>
+          <a:stretch>
+            <a:fillRect/>
+          </a:stretch>
+        </p:blipFill>
+        <p:spPr bwMode="auto">
+          <a:xfrm>
+            <a:off x="685800" y="1981200"/>
+            <a:ext cx="6848475" cy="3219450"/>
+          </a:xfrm>
+          <a:prstGeom prst="rect">
+            <a:avLst/>
+          </a:prstGeom>
+          <a:noFill/>
+          <a:ln>
+            <a:noFill/>
+          </a:ln>
+          <a:extLst>
+            <a:ext uri="{909E8E84-426E-40DD-AFC4-6F175D3DCCD1}">
+              <a14:hiddenFill xmlns:a14="http://schemas.microsoft.com/office/drawing/2010/main">
+                <a:solidFill>
+                  <a:schemeClr val="accent1"/>
+                </a:solidFill>
+              </a14:hiddenFill>
+            </a:ext>
+            <a:ext uri="{91240B29-F687-4F45-9708-019B960494DF}">
+              <a14:hiddenLine xmlns:a14="http://schemas.microsoft.com/office/drawing/2010/main" w="9525">
+                <a:solidFill>
+                  <a:schemeClr val="tx1"/>
+                </a:solidFill>
+                <a:miter lim="800000"/>
+                <a:headEnd/>
+                <a:tailEnd/>
+              </a14:hiddenLine>
+            </a:ext>
+          </a:extLst>
+        </p:spPr>
+      </p:pic>
     </p:spTree>
     <p:extLst>
       <p:ext uri="{BB962C8B-B14F-4D97-AF65-F5344CB8AC3E}">
@@ -4658,136 +5837,781 @@
         </p:nvSpPr>
         <p:spPr/>
         <p:txBody>
-          <a:bodyPr/>
-          <a:lstStyle/>
-          <a:p>
-            <a:r>
-              <a:rPr lang="en-US" dirty="0" smtClean="0"/>
-              <a:t>Language Related:</a:t>
-            </a:r>
-            <a:endParaRPr lang="en-US" dirty="0"/>
-          </a:p>
-        </p:txBody>
-      </p:sp>
-      <p:sp>
-        <p:nvSpPr>
-          <p:cNvPr id="3" name="Content Placeholder 2"/>
-          <p:cNvSpPr>
-            <a:spLocks noGrp="1"/>
-          </p:cNvSpPr>
-          <p:nvPr>
-            <p:ph sz="quarter" idx="1"/>
-          </p:nvPr>
-        </p:nvSpPr>
-        <p:spPr/>
-        <p:txBody>
           <a:bodyPr>
             <a:normAutofit/>
           </a:bodyPr>
           <a:lstStyle/>
           <a:p>
             <a:r>
+              <a:rPr lang="en-US" dirty="0"/>
+              <a:t>Knowing to </a:t>
+            </a:r>
+            <a:r>
+              <a:rPr lang="en-US" dirty="0" err="1"/>
+              <a:t>Git</a:t>
+            </a:r>
+            <a:endParaRPr lang="en-US" dirty="0"/>
+          </a:p>
+        </p:txBody>
+      </p:sp>
+      <p:sp>
+        <p:nvSpPr>
+          <p:cNvPr id="3" name="Content Placeholder 2"/>
+          <p:cNvSpPr>
+            <a:spLocks noGrp="1"/>
+          </p:cNvSpPr>
+          <p:nvPr>
+            <p:ph sz="quarter" idx="1"/>
+          </p:nvPr>
+        </p:nvSpPr>
+        <p:spPr/>
+        <p:txBody>
+          <a:bodyPr>
+            <a:normAutofit/>
+          </a:bodyPr>
+          <a:lstStyle/>
+          <a:p>
+            <a:r>
               <a:rPr lang="en-US" dirty="0" smtClean="0"/>
-              <a:t>JavaScript (</a:t>
-            </a:r>
-            <a:r>
-              <a:rPr lang="en-US" dirty="0"/>
-              <a:t>Weak </a:t>
+              <a:t>.</a:t>
+            </a:r>
+            <a:r>
+              <a:rPr lang="en-US" dirty="0" err="1" smtClean="0"/>
+              <a:t>git</a:t>
             </a:r>
             <a:r>
               <a:rPr lang="en-US" dirty="0" smtClean="0"/>
-              <a:t>Type / Flexibility)</a:t>
-            </a:r>
-          </a:p>
-          <a:p>
-            <a:r>
-              <a:rPr lang="en-US" dirty="0" err="1" smtClean="0"/>
-              <a:t>Extjs</a:t>
-            </a:r>
-            <a:r>
-              <a:rPr lang="en-US" dirty="0" smtClean="0"/>
-              <a:t> (Base on JS/ Client side only/ MVC/ </a:t>
-            </a:r>
-            <a:r>
-              <a:rPr lang="en-US" dirty="0" err="1" smtClean="0"/>
-              <a:t>config</a:t>
-            </a:r>
-            <a:r>
-              <a:rPr lang="en-US" dirty="0" smtClean="0"/>
-              <a:t> /sample)</a:t>
-            </a:r>
-          </a:p>
-          <a:p>
-            <a:r>
-              <a:rPr lang="en-US" dirty="0" smtClean="0"/>
-              <a:t>RPUX (Base on </a:t>
-            </a:r>
-            <a:r>
-              <a:rPr lang="en-US" dirty="0" err="1" smtClean="0"/>
-              <a:t>Extjs</a:t>
-            </a:r>
-            <a:r>
-              <a:rPr lang="en-US" dirty="0" smtClean="0"/>
-              <a:t>/like MCS/ Controllers set)</a:t>
-            </a:r>
-          </a:p>
-          <a:p>
-            <a:r>
-              <a:rPr lang="en-US" dirty="0" smtClean="0"/>
-              <a:t>CSS (cascade style sheet)</a:t>
-            </a:r>
-          </a:p>
-          <a:p>
-            <a:r>
-              <a:rPr lang="en-US" dirty="0" smtClean="0"/>
-              <a:t>MVC (Spring / </a:t>
-            </a:r>
-            <a:r>
-              <a:rPr lang="en-US" dirty="0" err="1" smtClean="0"/>
-              <a:t>Extjs</a:t>
-            </a:r>
-            <a:r>
-              <a:rPr lang="en-US" dirty="0" smtClean="0"/>
-              <a:t>)</a:t>
-            </a:r>
-          </a:p>
-          <a:p>
-            <a:r>
-              <a:rPr lang="en-US" dirty="0" smtClean="0"/>
-              <a:t>Sublime Text</a:t>
-            </a:r>
-          </a:p>
-          <a:p>
-            <a:r>
-              <a:rPr lang="en-US" dirty="0" smtClean="0"/>
-              <a:t>Debug (Chrome F12 /Multiple Brower's test/</a:t>
-            </a:r>
-            <a:r>
-              <a:rPr lang="en-US" dirty="0" err="1" smtClean="0"/>
-              <a:t>Ctrl+Sht+L</a:t>
-            </a:r>
-            <a:r>
-              <a:rPr lang="en-US" dirty="0" smtClean="0"/>
-              <a:t>)</a:t>
-            </a:r>
-          </a:p>
-          <a:p>
-            <a:r>
-              <a:rPr lang="en-US" dirty="0" err="1" smtClean="0"/>
-              <a:t>gjslint</a:t>
-            </a:r>
-            <a:r>
-              <a:rPr lang="en-US" dirty="0" smtClean="0"/>
-              <a:t> (JS style check) </a:t>
-            </a:r>
-            <a:endParaRPr lang="en-US" dirty="0"/>
-          </a:p>
-        </p:txBody>
-      </p:sp>
+              <a:t>/Objects</a:t>
+            </a:r>
+            <a:endParaRPr lang="en-US" dirty="0" smtClean="0"/>
+          </a:p>
+          <a:p>
+            <a:endParaRPr lang="en-US" dirty="0" smtClean="0"/>
+          </a:p>
+          <a:p>
+            <a:endParaRPr lang="en-US" dirty="0" smtClean="0"/>
+          </a:p>
+        </p:txBody>
+      </p:sp>
+      <p:pic>
+        <p:nvPicPr>
+          <p:cNvPr id="3074" name="Picture 2"/>
+          <p:cNvPicPr>
+            <a:picLocks noChangeAspect="1" noChangeArrowheads="1"/>
+          </p:cNvPicPr>
+          <p:nvPr/>
+        </p:nvPicPr>
+        <p:blipFill>
+          <a:blip r:embed="rId2">
+            <a:extLst>
+              <a:ext uri="{28A0092B-C50C-407E-A947-70E740481C1C}">
+                <a14:useLocalDpi xmlns:a14="http://schemas.microsoft.com/office/drawing/2010/main" val="0"/>
+              </a:ext>
+            </a:extLst>
+          </a:blip>
+          <a:srcRect/>
+          <a:stretch>
+            <a:fillRect/>
+          </a:stretch>
+        </p:blipFill>
+        <p:spPr bwMode="auto">
+          <a:xfrm>
+            <a:off x="609600" y="1981200"/>
+            <a:ext cx="7496175" cy="3829050"/>
+          </a:xfrm>
+          <a:prstGeom prst="rect">
+            <a:avLst/>
+          </a:prstGeom>
+          <a:noFill/>
+          <a:ln>
+            <a:noFill/>
+          </a:ln>
+          <a:extLst>
+            <a:ext uri="{909E8E84-426E-40DD-AFC4-6F175D3DCCD1}">
+              <a14:hiddenFill xmlns:a14="http://schemas.microsoft.com/office/drawing/2010/main">
+                <a:solidFill>
+                  <a:schemeClr val="accent1"/>
+                </a:solidFill>
+              </a14:hiddenFill>
+            </a:ext>
+            <a:ext uri="{91240B29-F687-4F45-9708-019B960494DF}">
+              <a14:hiddenLine xmlns:a14="http://schemas.microsoft.com/office/drawing/2010/main" w="9525">
+                <a:solidFill>
+                  <a:schemeClr val="tx1"/>
+                </a:solidFill>
+                <a:miter lim="800000"/>
+                <a:headEnd/>
+                <a:tailEnd/>
+              </a14:hiddenLine>
+            </a:ext>
+          </a:extLst>
+        </p:spPr>
+      </p:pic>
     </p:spTree>
     <p:extLst>
       <p:ext uri="{BB962C8B-B14F-4D97-AF65-F5344CB8AC3E}">
-        <p14:creationId xmlns:p14="http://schemas.microsoft.com/office/powerpoint/2010/main" val="2911417084"/>
+        <p14:creationId xmlns:p14="http://schemas.microsoft.com/office/powerpoint/2010/main" val="2428718002"/>
+      </p:ext>
+    </p:extLst>
+  </p:cSld>
+  <p:clrMapOvr>
+    <a:masterClrMapping/>
+  </p:clrMapOvr>
+  <mc:AlternateContent xmlns:mc="http://schemas.openxmlformats.org/markup-compatibility/2006" xmlns:p14="http://schemas.microsoft.com/office/powerpoint/2010/main">
+    <mc:Choice Requires="p14">
+      <p:transition spd="slow" p14:dur="2000"/>
+    </mc:Choice>
+    <mc:Fallback xmlns="">
+      <p:transition spd="slow"/>
+    </mc:Fallback>
+  </mc:AlternateContent>
+</p:sld>
+</file>
+
+<file path=ppt/slides/slide6.xml><?xml version="1.0" encoding="utf-8"?>
+<p:sld xmlns:a="http://schemas.openxmlformats.org/drawingml/2006/main" xmlns:r="http://schemas.openxmlformats.org/officeDocument/2006/relationships" xmlns:p="http://schemas.openxmlformats.org/presentationml/2006/main">
+  <p:cSld>
+    <p:spTree>
+      <p:nvGrpSpPr>
+        <p:cNvPr id="1" name=""/>
+        <p:cNvGrpSpPr/>
+        <p:nvPr/>
+      </p:nvGrpSpPr>
+      <p:grpSpPr>
+        <a:xfrm>
+          <a:off x="0" y="0"/>
+          <a:ext cx="0" cy="0"/>
+          <a:chOff x="0" y="0"/>
+          <a:chExt cx="0" cy="0"/>
+        </a:xfrm>
+      </p:grpSpPr>
+      <p:sp>
+        <p:nvSpPr>
+          <p:cNvPr id="2" name="Title 1"/>
+          <p:cNvSpPr>
+            <a:spLocks noGrp="1"/>
+          </p:cNvSpPr>
+          <p:nvPr>
+            <p:ph type="title"/>
+          </p:nvPr>
+        </p:nvSpPr>
+        <p:spPr/>
+        <p:txBody>
+          <a:bodyPr>
+            <a:normAutofit/>
+          </a:bodyPr>
+          <a:lstStyle/>
+          <a:p>
+            <a:r>
+              <a:rPr lang="en-US" dirty="0"/>
+              <a:t>Knowing to </a:t>
+            </a:r>
+            <a:r>
+              <a:rPr lang="en-US" dirty="0" err="1"/>
+              <a:t>Git</a:t>
+            </a:r>
+            <a:endParaRPr lang="en-US" dirty="0"/>
+          </a:p>
+        </p:txBody>
+      </p:sp>
+      <p:sp>
+        <p:nvSpPr>
+          <p:cNvPr id="3" name="Content Placeholder 2"/>
+          <p:cNvSpPr>
+            <a:spLocks noGrp="1"/>
+          </p:cNvSpPr>
+          <p:nvPr>
+            <p:ph sz="quarter" idx="1"/>
+          </p:nvPr>
+        </p:nvSpPr>
+        <p:spPr/>
+        <p:txBody>
+          <a:bodyPr>
+            <a:normAutofit/>
+          </a:bodyPr>
+          <a:lstStyle/>
+          <a:p>
+            <a:r>
+              <a:rPr lang="en-US" dirty="0" smtClean="0"/>
+              <a:t>.</a:t>
+            </a:r>
+            <a:r>
+              <a:rPr lang="en-US" dirty="0" err="1" smtClean="0"/>
+              <a:t>git</a:t>
+            </a:r>
+            <a:endParaRPr lang="en-US" dirty="0" smtClean="0"/>
+          </a:p>
+          <a:p>
+            <a:endParaRPr lang="en-US" dirty="0" smtClean="0"/>
+          </a:p>
+          <a:p>
+            <a:endParaRPr lang="en-US" dirty="0" smtClean="0"/>
+          </a:p>
+        </p:txBody>
+      </p:sp>
+      <p:pic>
+        <p:nvPicPr>
+          <p:cNvPr id="5122" name="Picture 2"/>
+          <p:cNvPicPr>
+            <a:picLocks noChangeAspect="1" noChangeArrowheads="1"/>
+          </p:cNvPicPr>
+          <p:nvPr/>
+        </p:nvPicPr>
+        <p:blipFill>
+          <a:blip r:embed="rId2">
+            <a:extLst>
+              <a:ext uri="{28A0092B-C50C-407E-A947-70E740481C1C}">
+                <a14:useLocalDpi xmlns:a14="http://schemas.microsoft.com/office/drawing/2010/main" val="0"/>
+              </a:ext>
+            </a:extLst>
+          </a:blip>
+          <a:srcRect/>
+          <a:stretch>
+            <a:fillRect/>
+          </a:stretch>
+        </p:blipFill>
+        <p:spPr bwMode="auto">
+          <a:xfrm>
+            <a:off x="914400" y="1676400"/>
+            <a:ext cx="6343650" cy="4495800"/>
+          </a:xfrm>
+          <a:prstGeom prst="rect">
+            <a:avLst/>
+          </a:prstGeom>
+          <a:noFill/>
+          <a:ln>
+            <a:noFill/>
+          </a:ln>
+          <a:extLst>
+            <a:ext uri="{909E8E84-426E-40DD-AFC4-6F175D3DCCD1}">
+              <a14:hiddenFill xmlns:a14="http://schemas.microsoft.com/office/drawing/2010/main">
+                <a:solidFill>
+                  <a:schemeClr val="accent1"/>
+                </a:solidFill>
+              </a14:hiddenFill>
+            </a:ext>
+            <a:ext uri="{91240B29-F687-4F45-9708-019B960494DF}">
+              <a14:hiddenLine xmlns:a14="http://schemas.microsoft.com/office/drawing/2010/main" w="9525">
+                <a:solidFill>
+                  <a:schemeClr val="tx1"/>
+                </a:solidFill>
+                <a:miter lim="800000"/>
+                <a:headEnd/>
+                <a:tailEnd/>
+              </a14:hiddenLine>
+            </a:ext>
+          </a:extLst>
+        </p:spPr>
+      </p:pic>
+    </p:spTree>
+    <p:extLst>
+      <p:ext uri="{BB962C8B-B14F-4D97-AF65-F5344CB8AC3E}">
+        <p14:creationId xmlns:p14="http://schemas.microsoft.com/office/powerpoint/2010/main" val="565867165"/>
+      </p:ext>
+    </p:extLst>
+  </p:cSld>
+  <p:clrMapOvr>
+    <a:masterClrMapping/>
+  </p:clrMapOvr>
+  <mc:AlternateContent xmlns:mc="http://schemas.openxmlformats.org/markup-compatibility/2006" xmlns:p14="http://schemas.microsoft.com/office/powerpoint/2010/main">
+    <mc:Choice Requires="p14">
+      <p:transition spd="slow" p14:dur="2000"/>
+    </mc:Choice>
+    <mc:Fallback xmlns="">
+      <p:transition spd="slow"/>
+    </mc:Fallback>
+  </mc:AlternateContent>
+</p:sld>
+</file>
+
+<file path=ppt/slides/slide7.xml><?xml version="1.0" encoding="utf-8"?>
+<p:sld xmlns:a="http://schemas.openxmlformats.org/drawingml/2006/main" xmlns:r="http://schemas.openxmlformats.org/officeDocument/2006/relationships" xmlns:p="http://schemas.openxmlformats.org/presentationml/2006/main">
+  <p:cSld>
+    <p:spTree>
+      <p:nvGrpSpPr>
+        <p:cNvPr id="1" name=""/>
+        <p:cNvGrpSpPr/>
+        <p:nvPr/>
+      </p:nvGrpSpPr>
+      <p:grpSpPr>
+        <a:xfrm>
+          <a:off x="0" y="0"/>
+          <a:ext cx="0" cy="0"/>
+          <a:chOff x="0" y="0"/>
+          <a:chExt cx="0" cy="0"/>
+        </a:xfrm>
+      </p:grpSpPr>
+      <p:sp>
+        <p:nvSpPr>
+          <p:cNvPr id="2" name="Title 1"/>
+          <p:cNvSpPr>
+            <a:spLocks noGrp="1"/>
+          </p:cNvSpPr>
+          <p:nvPr>
+            <p:ph type="title"/>
+          </p:nvPr>
+        </p:nvSpPr>
+        <p:spPr/>
+        <p:txBody>
+          <a:bodyPr>
+            <a:normAutofit/>
+          </a:bodyPr>
+          <a:lstStyle/>
+          <a:p>
+            <a:r>
+              <a:rPr lang="en-US" dirty="0"/>
+              <a:t>Knowing to </a:t>
+            </a:r>
+            <a:r>
+              <a:rPr lang="en-US" dirty="0" err="1"/>
+              <a:t>Git</a:t>
+            </a:r>
+            <a:endParaRPr lang="en-US" dirty="0"/>
+          </a:p>
+        </p:txBody>
+      </p:sp>
+      <p:sp>
+        <p:nvSpPr>
+          <p:cNvPr id="3" name="Content Placeholder 2"/>
+          <p:cNvSpPr>
+            <a:spLocks noGrp="1"/>
+          </p:cNvSpPr>
+          <p:nvPr>
+            <p:ph sz="quarter" idx="1"/>
+          </p:nvPr>
+        </p:nvSpPr>
+        <p:spPr/>
+        <p:txBody>
+          <a:bodyPr>
+            <a:normAutofit/>
+          </a:bodyPr>
+          <a:lstStyle/>
+          <a:p>
+            <a:r>
+              <a:rPr lang="en-US" dirty="0" smtClean="0"/>
+              <a:t>What is HEAD, master and index?</a:t>
+            </a:r>
+            <a:endParaRPr lang="en-US" dirty="0" smtClean="0"/>
+          </a:p>
+          <a:p>
+            <a:pPr marL="0" indent="0">
+              <a:buNone/>
+            </a:pPr>
+            <a:r>
+              <a:rPr lang="en-US" dirty="0" smtClean="0"/>
+              <a:t>.</a:t>
+            </a:r>
+            <a:r>
+              <a:rPr lang="en-US" dirty="0" err="1" smtClean="0"/>
+              <a:t>git</a:t>
+            </a:r>
+            <a:r>
+              <a:rPr lang="en-US" dirty="0" smtClean="0"/>
+              <a:t>/HEAD</a:t>
+            </a:r>
+          </a:p>
+          <a:p>
+            <a:pPr marL="0" indent="0">
+              <a:buNone/>
+            </a:pPr>
+            <a:r>
+              <a:rPr lang="en-US" sz="1600" dirty="0" smtClean="0"/>
+              <a:t>ref</a:t>
+            </a:r>
+            <a:r>
+              <a:rPr lang="en-US" sz="1600" dirty="0"/>
+              <a:t>: refs/heads/master</a:t>
+            </a:r>
+            <a:endParaRPr lang="en-US" sz="1600" dirty="0" smtClean="0"/>
+          </a:p>
+          <a:p>
+            <a:pPr marL="0" indent="0">
+              <a:buNone/>
+            </a:pPr>
+            <a:r>
+              <a:rPr lang="en-US" dirty="0" smtClean="0"/>
+              <a:t>.</a:t>
+            </a:r>
+            <a:r>
+              <a:rPr lang="en-US" dirty="0" err="1" smtClean="0"/>
+              <a:t>git</a:t>
+            </a:r>
+            <a:r>
+              <a:rPr lang="en-US" dirty="0" smtClean="0"/>
+              <a:t>/refs/heads/master</a:t>
+            </a:r>
+          </a:p>
+          <a:p>
+            <a:pPr marL="0" indent="0">
+              <a:buNone/>
+            </a:pPr>
+            <a:r>
+              <a:rPr lang="en-US" sz="1600" dirty="0"/>
+              <a:t>f1177479c70b56837afd50a6c05a747ea8bc3255</a:t>
+            </a:r>
+          </a:p>
+          <a:p>
+            <a:pPr marL="0" indent="0">
+              <a:buNone/>
+            </a:pPr>
+            <a:r>
+              <a:rPr lang="en-US" dirty="0"/>
+              <a:t>.</a:t>
+            </a:r>
+            <a:r>
+              <a:rPr lang="en-US" dirty="0" err="1" smtClean="0"/>
+              <a:t>git</a:t>
+            </a:r>
+            <a:r>
+              <a:rPr lang="en-US" dirty="0" smtClean="0"/>
+              <a:t>/Index</a:t>
+            </a:r>
+          </a:p>
+          <a:p>
+            <a:r>
+              <a:rPr lang="en-US" dirty="0" smtClean="0"/>
+              <a:t>What does HEAD^ and </a:t>
+            </a:r>
+            <a:r>
+              <a:rPr lang="en-US" dirty="0" err="1" smtClean="0"/>
+              <a:t>HEAD~n</a:t>
+            </a:r>
+            <a:r>
+              <a:rPr lang="en-US" dirty="0" smtClean="0"/>
+              <a:t> mean?</a:t>
+            </a:r>
+            <a:endParaRPr lang="en-US" dirty="0"/>
+          </a:p>
+          <a:p>
+            <a:pPr marL="0" indent="0">
+              <a:buNone/>
+            </a:pPr>
+            <a:endParaRPr lang="en-US" dirty="0"/>
+          </a:p>
+          <a:p>
+            <a:pPr marL="0" indent="0">
+              <a:buNone/>
+            </a:pPr>
+            <a:endParaRPr lang="en-US" dirty="0" smtClean="0"/>
+          </a:p>
+        </p:txBody>
+      </p:sp>
+    </p:spTree>
+    <p:extLst>
+      <p:ext uri="{BB962C8B-B14F-4D97-AF65-F5344CB8AC3E}">
+        <p14:creationId xmlns:p14="http://schemas.microsoft.com/office/powerpoint/2010/main" val="1492516612"/>
+      </p:ext>
+    </p:extLst>
+  </p:cSld>
+  <p:clrMapOvr>
+    <a:masterClrMapping/>
+  </p:clrMapOvr>
+  <mc:AlternateContent xmlns:mc="http://schemas.openxmlformats.org/markup-compatibility/2006" xmlns:p14="http://schemas.microsoft.com/office/powerpoint/2010/main">
+    <mc:Choice Requires="p14">
+      <p:transition spd="slow" p14:dur="2000"/>
+    </mc:Choice>
+    <mc:Fallback xmlns="">
+      <p:transition spd="slow"/>
+    </mc:Fallback>
+  </mc:AlternateContent>
+</p:sld>
+</file>
+
+<file path=ppt/slides/slide8.xml><?xml version="1.0" encoding="utf-8"?>
+<p:sld xmlns:a="http://schemas.openxmlformats.org/drawingml/2006/main" xmlns:r="http://schemas.openxmlformats.org/officeDocument/2006/relationships" xmlns:p="http://schemas.openxmlformats.org/presentationml/2006/main">
+  <p:cSld>
+    <p:spTree>
+      <p:nvGrpSpPr>
+        <p:cNvPr id="1" name=""/>
+        <p:cNvGrpSpPr/>
+        <p:nvPr/>
+      </p:nvGrpSpPr>
+      <p:grpSpPr>
+        <a:xfrm>
+          <a:off x="0" y="0"/>
+          <a:ext cx="0" cy="0"/>
+          <a:chOff x="0" y="0"/>
+          <a:chExt cx="0" cy="0"/>
+        </a:xfrm>
+      </p:grpSpPr>
+      <p:sp>
+        <p:nvSpPr>
+          <p:cNvPr id="2" name="Title 1"/>
+          <p:cNvSpPr>
+            <a:spLocks noGrp="1"/>
+          </p:cNvSpPr>
+          <p:nvPr>
+            <p:ph type="title"/>
+          </p:nvPr>
+        </p:nvSpPr>
+        <p:spPr/>
+        <p:txBody>
+          <a:bodyPr>
+            <a:normAutofit/>
+          </a:bodyPr>
+          <a:lstStyle/>
+          <a:p>
+            <a:r>
+              <a:rPr lang="en-US" dirty="0"/>
+              <a:t>Knowing to </a:t>
+            </a:r>
+            <a:r>
+              <a:rPr lang="en-US" dirty="0" err="1"/>
+              <a:t>Git</a:t>
+            </a:r>
+            <a:endParaRPr lang="en-US" dirty="0"/>
+          </a:p>
+        </p:txBody>
+      </p:sp>
+      <p:sp>
+        <p:nvSpPr>
+          <p:cNvPr id="3" name="Content Placeholder 2"/>
+          <p:cNvSpPr>
+            <a:spLocks noGrp="1"/>
+          </p:cNvSpPr>
+          <p:nvPr>
+            <p:ph sz="quarter" idx="1"/>
+          </p:nvPr>
+        </p:nvSpPr>
+        <p:spPr/>
+        <p:txBody>
+          <a:bodyPr>
+            <a:normAutofit/>
+          </a:bodyPr>
+          <a:lstStyle/>
+          <a:p>
+            <a:r>
+              <a:rPr lang="en-US" dirty="0" err="1" smtClean="0"/>
+              <a:t>Git</a:t>
+            </a:r>
+            <a:r>
+              <a:rPr lang="en-US" dirty="0" smtClean="0"/>
+              <a:t> diff</a:t>
+            </a:r>
+            <a:endParaRPr lang="en-US" dirty="0" smtClean="0"/>
+          </a:p>
+          <a:p>
+            <a:endParaRPr lang="en-US" dirty="0" smtClean="0"/>
+          </a:p>
+          <a:p>
+            <a:endParaRPr lang="en-US" dirty="0" smtClean="0"/>
+          </a:p>
+        </p:txBody>
+      </p:sp>
+      <p:pic>
+        <p:nvPicPr>
+          <p:cNvPr id="2050" name="Picture 2"/>
+          <p:cNvPicPr>
+            <a:picLocks noChangeAspect="1" noChangeArrowheads="1"/>
+          </p:cNvPicPr>
+          <p:nvPr/>
+        </p:nvPicPr>
+        <p:blipFill>
+          <a:blip r:embed="rId2">
+            <a:extLst>
+              <a:ext uri="{28A0092B-C50C-407E-A947-70E740481C1C}">
+                <a14:useLocalDpi xmlns:a14="http://schemas.microsoft.com/office/drawing/2010/main" val="0"/>
+              </a:ext>
+            </a:extLst>
+          </a:blip>
+          <a:srcRect/>
+          <a:stretch>
+            <a:fillRect/>
+          </a:stretch>
+        </p:blipFill>
+        <p:spPr bwMode="auto">
+          <a:xfrm>
+            <a:off x="1385888" y="1695450"/>
+            <a:ext cx="6372225" cy="3467100"/>
+          </a:xfrm>
+          <a:prstGeom prst="rect">
+            <a:avLst/>
+          </a:prstGeom>
+          <a:noFill/>
+          <a:ln>
+            <a:noFill/>
+          </a:ln>
+          <a:extLst>
+            <a:ext uri="{909E8E84-426E-40DD-AFC4-6F175D3DCCD1}">
+              <a14:hiddenFill xmlns:a14="http://schemas.microsoft.com/office/drawing/2010/main">
+                <a:solidFill>
+                  <a:schemeClr val="accent1"/>
+                </a:solidFill>
+              </a14:hiddenFill>
+            </a:ext>
+            <a:ext uri="{91240B29-F687-4F45-9708-019B960494DF}">
+              <a14:hiddenLine xmlns:a14="http://schemas.microsoft.com/office/drawing/2010/main" w="9525">
+                <a:solidFill>
+                  <a:schemeClr val="tx1"/>
+                </a:solidFill>
+                <a:miter lim="800000"/>
+                <a:headEnd/>
+                <a:tailEnd/>
+              </a14:hiddenLine>
+            </a:ext>
+          </a:extLst>
+        </p:spPr>
+      </p:pic>
+    </p:spTree>
+    <p:extLst>
+      <p:ext uri="{BB962C8B-B14F-4D97-AF65-F5344CB8AC3E}">
+        <p14:creationId xmlns:p14="http://schemas.microsoft.com/office/powerpoint/2010/main" val="3784277457"/>
+      </p:ext>
+    </p:extLst>
+  </p:cSld>
+  <p:clrMapOvr>
+    <a:masterClrMapping/>
+  </p:clrMapOvr>
+  <mc:AlternateContent xmlns:mc="http://schemas.openxmlformats.org/markup-compatibility/2006" xmlns:p14="http://schemas.microsoft.com/office/powerpoint/2010/main">
+    <mc:Choice Requires="p14">
+      <p:transition spd="slow" p14:dur="2000"/>
+    </mc:Choice>
+    <mc:Fallback xmlns="">
+      <p:transition spd="slow"/>
+    </mc:Fallback>
+  </mc:AlternateContent>
+</p:sld>
+</file>
+
+<file path=ppt/slides/slide9.xml><?xml version="1.0" encoding="utf-8"?>
+<p:sld xmlns:a="http://schemas.openxmlformats.org/drawingml/2006/main" xmlns:r="http://schemas.openxmlformats.org/officeDocument/2006/relationships" xmlns:p="http://schemas.openxmlformats.org/presentationml/2006/main">
+  <p:cSld>
+    <p:spTree>
+      <p:nvGrpSpPr>
+        <p:cNvPr id="1" name=""/>
+        <p:cNvGrpSpPr/>
+        <p:nvPr/>
+      </p:nvGrpSpPr>
+      <p:grpSpPr>
+        <a:xfrm>
+          <a:off x="0" y="0"/>
+          <a:ext cx="0" cy="0"/>
+          <a:chOff x="0" y="0"/>
+          <a:chExt cx="0" cy="0"/>
+        </a:xfrm>
+      </p:grpSpPr>
+      <p:sp>
+        <p:nvSpPr>
+          <p:cNvPr id="2" name="Title 1"/>
+          <p:cNvSpPr>
+            <a:spLocks noGrp="1"/>
+          </p:cNvSpPr>
+          <p:nvPr>
+            <p:ph type="title"/>
+          </p:nvPr>
+        </p:nvSpPr>
+        <p:spPr/>
+        <p:txBody>
+          <a:bodyPr>
+            <a:normAutofit/>
+          </a:bodyPr>
+          <a:lstStyle/>
+          <a:p>
+            <a:r>
+              <a:rPr lang="en-US" dirty="0"/>
+              <a:t>Knowing to </a:t>
+            </a:r>
+            <a:r>
+              <a:rPr lang="en-US" dirty="0" err="1"/>
+              <a:t>Git</a:t>
+            </a:r>
+            <a:endParaRPr lang="en-US" dirty="0"/>
+          </a:p>
+        </p:txBody>
+      </p:sp>
+      <p:sp>
+        <p:nvSpPr>
+          <p:cNvPr id="3" name="Content Placeholder 2"/>
+          <p:cNvSpPr>
+            <a:spLocks noGrp="1"/>
+          </p:cNvSpPr>
+          <p:nvPr>
+            <p:ph sz="quarter" idx="1"/>
+          </p:nvPr>
+        </p:nvSpPr>
+        <p:spPr/>
+        <p:txBody>
+          <a:bodyPr>
+            <a:normAutofit/>
+          </a:bodyPr>
+          <a:lstStyle/>
+          <a:p>
+            <a:r>
+              <a:rPr lang="en-US" dirty="0" err="1" smtClean="0"/>
+              <a:t>Git</a:t>
+            </a:r>
+            <a:r>
+              <a:rPr lang="en-US" dirty="0" smtClean="0"/>
+              <a:t> reset</a:t>
+            </a:r>
+            <a:endParaRPr lang="en-US" dirty="0" smtClean="0"/>
+          </a:p>
+          <a:p>
+            <a:endParaRPr lang="en-US" dirty="0" smtClean="0"/>
+          </a:p>
+          <a:p>
+            <a:endParaRPr lang="en-US" dirty="0" smtClean="0"/>
+          </a:p>
+        </p:txBody>
+      </p:sp>
+      <p:pic>
+        <p:nvPicPr>
+          <p:cNvPr id="4098" name="Picture 2"/>
+          <p:cNvPicPr>
+            <a:picLocks noChangeAspect="1" noChangeArrowheads="1"/>
+          </p:cNvPicPr>
+          <p:nvPr/>
+        </p:nvPicPr>
+        <p:blipFill>
+          <a:blip r:embed="rId2">
+            <a:extLst>
+              <a:ext uri="{28A0092B-C50C-407E-A947-70E740481C1C}">
+                <a14:useLocalDpi xmlns:a14="http://schemas.microsoft.com/office/drawing/2010/main" val="0"/>
+              </a:ext>
+            </a:extLst>
+          </a:blip>
+          <a:srcRect/>
+          <a:stretch>
+            <a:fillRect/>
+          </a:stretch>
+        </p:blipFill>
+        <p:spPr bwMode="auto">
+          <a:xfrm>
+            <a:off x="709613" y="1828800"/>
+            <a:ext cx="7724775" cy="3733800"/>
+          </a:xfrm>
+          <a:prstGeom prst="rect">
+            <a:avLst/>
+          </a:prstGeom>
+          <a:noFill/>
+          <a:ln>
+            <a:noFill/>
+          </a:ln>
+          <a:extLst>
+            <a:ext uri="{909E8E84-426E-40DD-AFC4-6F175D3DCCD1}">
+              <a14:hiddenFill xmlns:a14="http://schemas.microsoft.com/office/drawing/2010/main">
+                <a:solidFill>
+                  <a:schemeClr val="accent1"/>
+                </a:solidFill>
+              </a14:hiddenFill>
+            </a:ext>
+            <a:ext uri="{91240B29-F687-4F45-9708-019B960494DF}">
+              <a14:hiddenLine xmlns:a14="http://schemas.microsoft.com/office/drawing/2010/main" w="9525">
+                <a:solidFill>
+                  <a:schemeClr val="tx1"/>
+                </a:solidFill>
+                <a:miter lim="800000"/>
+                <a:headEnd/>
+                <a:tailEnd/>
+              </a14:hiddenLine>
+            </a:ext>
+          </a:extLst>
+        </p:spPr>
+      </p:pic>
+    </p:spTree>
+    <p:extLst>
+      <p:ext uri="{BB962C8B-B14F-4D97-AF65-F5344CB8AC3E}">
+        <p14:creationId xmlns:p14="http://schemas.microsoft.com/office/powerpoint/2010/main" val="467724190"/>
       </p:ext>
     </p:extLst>
   </p:cSld>

</xml_diff>